<commit_message>
Update function slides, remove CV example, Update type/class example
</commit_message>
<xml_diff>
--- a/rslides/img/syntax.pptx
+++ b/rslides/img/syntax.pptx
@@ -16,6 +16,7 @@
     <p:sldId id="264" r:id="rId10"/>
     <p:sldId id="265" r:id="rId11"/>
     <p:sldId id="266" r:id="rId12"/>
+    <p:sldId id="267" r:id="rId13"/>
   </p:sldIdLst>
   <p:sldSz cx="12192000" cy="6858000"/>
   <p:notesSz cx="6858000" cy="9144000"/>
@@ -269,7 +270,7 @@
           <a:p>
             <a:fld id="{725C22C8-53FC-4A32-BD54-17F623330BA0}" type="datetimeFigureOut">
               <a:rPr lang="en-US" smtClean="0"/>
-              <a:t>6/14/2022</a:t>
+              <a:t>6/16/2022</a:t>
             </a:fld>
             <a:endParaRPr lang="en-US"/>
           </a:p>
@@ -467,7 +468,7 @@
           <a:p>
             <a:fld id="{725C22C8-53FC-4A32-BD54-17F623330BA0}" type="datetimeFigureOut">
               <a:rPr lang="en-US" smtClean="0"/>
-              <a:t>6/14/2022</a:t>
+              <a:t>6/16/2022</a:t>
             </a:fld>
             <a:endParaRPr lang="en-US"/>
           </a:p>
@@ -675,7 +676,7 @@
           <a:p>
             <a:fld id="{725C22C8-53FC-4A32-BD54-17F623330BA0}" type="datetimeFigureOut">
               <a:rPr lang="en-US" smtClean="0"/>
-              <a:t>6/14/2022</a:t>
+              <a:t>6/16/2022</a:t>
             </a:fld>
             <a:endParaRPr lang="en-US"/>
           </a:p>
@@ -873,7 +874,7 @@
           <a:p>
             <a:fld id="{725C22C8-53FC-4A32-BD54-17F623330BA0}" type="datetimeFigureOut">
               <a:rPr lang="en-US" smtClean="0"/>
-              <a:t>6/14/2022</a:t>
+              <a:t>6/16/2022</a:t>
             </a:fld>
             <a:endParaRPr lang="en-US"/>
           </a:p>
@@ -1148,7 +1149,7 @@
           <a:p>
             <a:fld id="{725C22C8-53FC-4A32-BD54-17F623330BA0}" type="datetimeFigureOut">
               <a:rPr lang="en-US" smtClean="0"/>
-              <a:t>6/14/2022</a:t>
+              <a:t>6/16/2022</a:t>
             </a:fld>
             <a:endParaRPr lang="en-US"/>
           </a:p>
@@ -1413,7 +1414,7 @@
           <a:p>
             <a:fld id="{725C22C8-53FC-4A32-BD54-17F623330BA0}" type="datetimeFigureOut">
               <a:rPr lang="en-US" smtClean="0"/>
-              <a:t>6/14/2022</a:t>
+              <a:t>6/16/2022</a:t>
             </a:fld>
             <a:endParaRPr lang="en-US"/>
           </a:p>
@@ -1825,7 +1826,7 @@
           <a:p>
             <a:fld id="{725C22C8-53FC-4A32-BD54-17F623330BA0}" type="datetimeFigureOut">
               <a:rPr lang="en-US" smtClean="0"/>
-              <a:t>6/14/2022</a:t>
+              <a:t>6/16/2022</a:t>
             </a:fld>
             <a:endParaRPr lang="en-US"/>
           </a:p>
@@ -1966,7 +1967,7 @@
           <a:p>
             <a:fld id="{725C22C8-53FC-4A32-BD54-17F623330BA0}" type="datetimeFigureOut">
               <a:rPr lang="en-US" smtClean="0"/>
-              <a:t>6/14/2022</a:t>
+              <a:t>6/16/2022</a:t>
             </a:fld>
             <a:endParaRPr lang="en-US"/>
           </a:p>
@@ -2079,7 +2080,7 @@
           <a:p>
             <a:fld id="{725C22C8-53FC-4A32-BD54-17F623330BA0}" type="datetimeFigureOut">
               <a:rPr lang="en-US" smtClean="0"/>
-              <a:t>6/14/2022</a:t>
+              <a:t>6/16/2022</a:t>
             </a:fld>
             <a:endParaRPr lang="en-US"/>
           </a:p>
@@ -2390,7 +2391,7 @@
           <a:p>
             <a:fld id="{725C22C8-53FC-4A32-BD54-17F623330BA0}" type="datetimeFigureOut">
               <a:rPr lang="en-US" smtClean="0"/>
-              <a:t>6/14/2022</a:t>
+              <a:t>6/16/2022</a:t>
             </a:fld>
             <a:endParaRPr lang="en-US"/>
           </a:p>
@@ -2678,7 +2679,7 @@
           <a:p>
             <a:fld id="{725C22C8-53FC-4A32-BD54-17F623330BA0}" type="datetimeFigureOut">
               <a:rPr lang="en-US" smtClean="0"/>
-              <a:t>6/14/2022</a:t>
+              <a:t>6/16/2022</a:t>
             </a:fld>
             <a:endParaRPr lang="en-US"/>
           </a:p>
@@ -2919,7 +2920,7 @@
           <a:p>
             <a:fld id="{725C22C8-53FC-4A32-BD54-17F623330BA0}" type="datetimeFigureOut">
               <a:rPr lang="en-US" smtClean="0"/>
-              <a:t>6/14/2022</a:t>
+              <a:t>6/16/2022</a:t>
             </a:fld>
             <a:endParaRPr lang="en-US"/>
           </a:p>
@@ -5005,6 +5006,348 @@
 </p:sld>
 </file>
 
+<file path=ppt/slides/slide12.xml><?xml version="1.0" encoding="utf-8"?>
+<p:sld xmlns:a="http://schemas.openxmlformats.org/drawingml/2006/main" xmlns:r="http://schemas.openxmlformats.org/officeDocument/2006/relationships" xmlns:p="http://schemas.openxmlformats.org/presentationml/2006/main">
+  <p:cSld>
+    <p:spTree>
+      <p:nvGrpSpPr>
+        <p:cNvPr id="1" name=""/>
+        <p:cNvGrpSpPr/>
+        <p:nvPr/>
+      </p:nvGrpSpPr>
+      <p:grpSpPr>
+        <a:xfrm>
+          <a:off x="0" y="0"/>
+          <a:ext cx="0" cy="0"/>
+          <a:chOff x="0" y="0"/>
+          <a:chExt cx="0" cy="0"/>
+        </a:xfrm>
+      </p:grpSpPr>
+      <p:sp>
+        <p:nvSpPr>
+          <p:cNvPr id="2" name="TextBox 1">
+            <a:extLst>
+              <a:ext uri="{FF2B5EF4-FFF2-40B4-BE49-F238E27FC236}">
+                <a16:creationId xmlns:a16="http://schemas.microsoft.com/office/drawing/2014/main" id="{6C400A63-0659-569E-8FAA-D1F2F246CB2F}"/>
+              </a:ext>
+            </a:extLst>
+          </p:cNvPr>
+          <p:cNvSpPr txBox="1"/>
+          <p:nvPr/>
+        </p:nvSpPr>
+        <p:spPr>
+          <a:xfrm>
+            <a:off x="355600" y="812800"/>
+            <a:ext cx="2937933" cy="523220"/>
+          </a:xfrm>
+          <a:prstGeom prst="rect">
+            <a:avLst/>
+          </a:prstGeom>
+          <a:noFill/>
+        </p:spPr>
+        <p:txBody>
+          <a:bodyPr wrap="square" rtlCol="0">
+            <a:spAutoFit/>
+          </a:bodyPr>
+          <a:lstStyle/>
+          <a:p>
+            <a:r>
+              <a:rPr lang="en-US" dirty="0"/>
+              <a:t> </a:t>
+            </a:r>
+            <a:r>
+              <a:rPr lang="en-US" sz="2800" dirty="0"/>
+              <a:t>class(x)</a:t>
+            </a:r>
+          </a:p>
+        </p:txBody>
+      </p:sp>
+      <p:cxnSp>
+        <p:nvCxnSpPr>
+          <p:cNvPr id="6" name="Connector: Elbow 5">
+            <a:extLst>
+              <a:ext uri="{FF2B5EF4-FFF2-40B4-BE49-F238E27FC236}">
+                <a16:creationId xmlns:a16="http://schemas.microsoft.com/office/drawing/2014/main" id="{93AAA1EF-E6A6-9265-4773-53A42BCAC740}"/>
+              </a:ext>
+            </a:extLst>
+          </p:cNvPr>
+          <p:cNvCxnSpPr>
+            <a:cxnSpLocks/>
+          </p:cNvCxnSpPr>
+          <p:nvPr/>
+        </p:nvCxnSpPr>
+        <p:spPr>
+          <a:xfrm>
+            <a:off x="1397000" y="1270000"/>
+            <a:ext cx="651933" cy="523219"/>
+          </a:xfrm>
+          <a:prstGeom prst="bentConnector3">
+            <a:avLst>
+              <a:gd name="adj1" fmla="val -1948"/>
+            </a:avLst>
+          </a:prstGeom>
+          <a:ln>
+            <a:tailEnd type="triangle"/>
+          </a:ln>
+        </p:spPr>
+        <p:style>
+          <a:lnRef idx="3">
+            <a:schemeClr val="accent2"/>
+          </a:lnRef>
+          <a:fillRef idx="0">
+            <a:schemeClr val="accent2"/>
+          </a:fillRef>
+          <a:effectRef idx="2">
+            <a:schemeClr val="accent2"/>
+          </a:effectRef>
+          <a:fontRef idx="minor">
+            <a:schemeClr val="tx1"/>
+          </a:fontRef>
+        </p:style>
+      </p:cxnSp>
+      <p:sp>
+        <p:nvSpPr>
+          <p:cNvPr id="14" name="TextBox 13">
+            <a:extLst>
+              <a:ext uri="{FF2B5EF4-FFF2-40B4-BE49-F238E27FC236}">
+                <a16:creationId xmlns:a16="http://schemas.microsoft.com/office/drawing/2014/main" id="{CE58EFC0-3548-5269-5F2C-CA2A5F3D36F1}"/>
+              </a:ext>
+            </a:extLst>
+          </p:cNvPr>
+          <p:cNvSpPr txBox="1"/>
+          <p:nvPr/>
+        </p:nvSpPr>
+        <p:spPr>
+          <a:xfrm>
+            <a:off x="2048933" y="1608553"/>
+            <a:ext cx="2277533" cy="369332"/>
+          </a:xfrm>
+          <a:prstGeom prst="rect">
+            <a:avLst/>
+          </a:prstGeom>
+          <a:noFill/>
+        </p:spPr>
+        <p:txBody>
+          <a:bodyPr wrap="square" rtlCol="0">
+            <a:spAutoFit/>
+          </a:bodyPr>
+          <a:lstStyle/>
+          <a:p>
+            <a:r>
+              <a:rPr lang="en-US" dirty="0"/>
+              <a:t>X = an R object</a:t>
+            </a:r>
+          </a:p>
+        </p:txBody>
+      </p:sp>
+      <p:sp>
+        <p:nvSpPr>
+          <p:cNvPr id="20" name="TextBox 19">
+            <a:extLst>
+              <a:ext uri="{FF2B5EF4-FFF2-40B4-BE49-F238E27FC236}">
+                <a16:creationId xmlns:a16="http://schemas.microsoft.com/office/drawing/2014/main" id="{473659ED-9C36-96F3-5040-43992EE6565F}"/>
+              </a:ext>
+            </a:extLst>
+          </p:cNvPr>
+          <p:cNvSpPr txBox="1"/>
+          <p:nvPr/>
+        </p:nvSpPr>
+        <p:spPr>
+          <a:xfrm>
+            <a:off x="3979334" y="812800"/>
+            <a:ext cx="4165599" cy="523220"/>
+          </a:xfrm>
+          <a:prstGeom prst="rect">
+            <a:avLst/>
+          </a:prstGeom>
+          <a:noFill/>
+        </p:spPr>
+        <p:txBody>
+          <a:bodyPr wrap="square" rtlCol="0">
+            <a:spAutoFit/>
+          </a:bodyPr>
+          <a:lstStyle/>
+          <a:p>
+            <a:r>
+              <a:rPr lang="en-US" dirty="0"/>
+              <a:t> </a:t>
+            </a:r>
+            <a:r>
+              <a:rPr lang="en-US" sz="2800" dirty="0"/>
+              <a:t>mean(x, na.rm = FALSE)</a:t>
+            </a:r>
+          </a:p>
+        </p:txBody>
+      </p:sp>
+      <p:cxnSp>
+        <p:nvCxnSpPr>
+          <p:cNvPr id="21" name="Connector: Elbow 20">
+            <a:extLst>
+              <a:ext uri="{FF2B5EF4-FFF2-40B4-BE49-F238E27FC236}">
+                <a16:creationId xmlns:a16="http://schemas.microsoft.com/office/drawing/2014/main" id="{C00C9A25-1B9C-5897-D7B0-B32A14FFDF90}"/>
+              </a:ext>
+            </a:extLst>
+          </p:cNvPr>
+          <p:cNvCxnSpPr>
+            <a:cxnSpLocks/>
+          </p:cNvCxnSpPr>
+          <p:nvPr/>
+        </p:nvCxnSpPr>
+        <p:spPr>
+          <a:xfrm>
+            <a:off x="5122333" y="1269999"/>
+            <a:ext cx="651933" cy="523219"/>
+          </a:xfrm>
+          <a:prstGeom prst="bentConnector3">
+            <a:avLst>
+              <a:gd name="adj1" fmla="val -1948"/>
+            </a:avLst>
+          </a:prstGeom>
+          <a:ln>
+            <a:tailEnd type="triangle"/>
+          </a:ln>
+        </p:spPr>
+        <p:style>
+          <a:lnRef idx="3">
+            <a:schemeClr val="accent2"/>
+          </a:lnRef>
+          <a:fillRef idx="0">
+            <a:schemeClr val="accent2"/>
+          </a:fillRef>
+          <a:effectRef idx="2">
+            <a:schemeClr val="accent2"/>
+          </a:effectRef>
+          <a:fontRef idx="minor">
+            <a:schemeClr val="tx1"/>
+          </a:fontRef>
+        </p:style>
+      </p:cxnSp>
+      <p:sp>
+        <p:nvSpPr>
+          <p:cNvPr id="22" name="TextBox 21">
+            <a:extLst>
+              <a:ext uri="{FF2B5EF4-FFF2-40B4-BE49-F238E27FC236}">
+                <a16:creationId xmlns:a16="http://schemas.microsoft.com/office/drawing/2014/main" id="{EA14903C-B353-0D60-0DA2-7661832C731B}"/>
+              </a:ext>
+            </a:extLst>
+          </p:cNvPr>
+          <p:cNvSpPr txBox="1"/>
+          <p:nvPr/>
+        </p:nvSpPr>
+        <p:spPr>
+          <a:xfrm>
+            <a:off x="5774266" y="1608553"/>
+            <a:ext cx="2277533" cy="369332"/>
+          </a:xfrm>
+          <a:prstGeom prst="rect">
+            <a:avLst/>
+          </a:prstGeom>
+          <a:noFill/>
+        </p:spPr>
+        <p:txBody>
+          <a:bodyPr wrap="square" rtlCol="0">
+            <a:spAutoFit/>
+          </a:bodyPr>
+          <a:lstStyle/>
+          <a:p>
+            <a:r>
+              <a:rPr lang="en-US" dirty="0"/>
+              <a:t>X = an R object</a:t>
+            </a:r>
+          </a:p>
+        </p:txBody>
+      </p:sp>
+      <p:cxnSp>
+        <p:nvCxnSpPr>
+          <p:cNvPr id="23" name="Connector: Elbow 22">
+            <a:extLst>
+              <a:ext uri="{FF2B5EF4-FFF2-40B4-BE49-F238E27FC236}">
+                <a16:creationId xmlns:a16="http://schemas.microsoft.com/office/drawing/2014/main" id="{B18BE7D9-F2A6-48C0-17A9-64A67D97D3FC}"/>
+              </a:ext>
+            </a:extLst>
+          </p:cNvPr>
+          <p:cNvCxnSpPr>
+            <a:cxnSpLocks/>
+          </p:cNvCxnSpPr>
+          <p:nvPr/>
+        </p:nvCxnSpPr>
+        <p:spPr>
+          <a:xfrm>
+            <a:off x="5935133" y="1210677"/>
+            <a:ext cx="1888066" cy="320931"/>
+          </a:xfrm>
+          <a:prstGeom prst="bentConnector3">
+            <a:avLst>
+              <a:gd name="adj1" fmla="val -673"/>
+            </a:avLst>
+          </a:prstGeom>
+          <a:ln>
+            <a:tailEnd type="triangle"/>
+          </a:ln>
+        </p:spPr>
+        <p:style>
+          <a:lnRef idx="3">
+            <a:schemeClr val="accent2"/>
+          </a:lnRef>
+          <a:fillRef idx="0">
+            <a:schemeClr val="accent2"/>
+          </a:fillRef>
+          <a:effectRef idx="2">
+            <a:schemeClr val="accent2"/>
+          </a:effectRef>
+          <a:fontRef idx="minor">
+            <a:schemeClr val="tx1"/>
+          </a:fontRef>
+        </p:style>
+      </p:cxnSp>
+      <p:sp>
+        <p:nvSpPr>
+          <p:cNvPr id="28" name="TextBox 27">
+            <a:extLst>
+              <a:ext uri="{FF2B5EF4-FFF2-40B4-BE49-F238E27FC236}">
+                <a16:creationId xmlns:a16="http://schemas.microsoft.com/office/drawing/2014/main" id="{75AB65B1-1F9F-EF4B-65B7-4AC4165FCAC6}"/>
+              </a:ext>
+            </a:extLst>
+          </p:cNvPr>
+          <p:cNvSpPr txBox="1"/>
+          <p:nvPr/>
+        </p:nvSpPr>
+        <p:spPr>
+          <a:xfrm>
+            <a:off x="7823199" y="1336020"/>
+            <a:ext cx="2277533" cy="1200329"/>
+          </a:xfrm>
+          <a:prstGeom prst="rect">
+            <a:avLst/>
+          </a:prstGeom>
+          <a:noFill/>
+        </p:spPr>
+        <p:txBody>
+          <a:bodyPr wrap="square" rtlCol="0">
+            <a:spAutoFit/>
+          </a:bodyPr>
+          <a:lstStyle/>
+          <a:p>
+            <a:r>
+              <a:rPr lang="en-US" dirty="0"/>
+              <a:t>na.rm is an argument that can be set to TRUE or FALSE. The default is FALSE</a:t>
+            </a:r>
+          </a:p>
+        </p:txBody>
+      </p:sp>
+    </p:spTree>
+    <p:extLst>
+      <p:ext uri="{BB962C8B-B14F-4D97-AF65-F5344CB8AC3E}">
+        <p14:creationId xmlns:p14="http://schemas.microsoft.com/office/powerpoint/2010/main" val="4039629376"/>
+      </p:ext>
+    </p:extLst>
+  </p:cSld>
+  <p:clrMapOvr>
+    <a:masterClrMapping/>
+  </p:clrMapOvr>
+</p:sld>
+</file>
+
 <file path=ppt/slides/slide2.xml><?xml version="1.0" encoding="utf-8"?>
 <p:sld xmlns:a="http://schemas.openxmlformats.org/drawingml/2006/main" xmlns:r="http://schemas.openxmlformats.org/officeDocument/2006/relationships" xmlns:p="http://schemas.openxmlformats.org/presentationml/2006/main">
   <p:cSld>

</xml_diff>